<commit_message>
Finish Banner And my part in Report
</commit_message>
<xml_diff>
--- a/Documents/Bannar T42.pptx
+++ b/Documents/Bannar T42.pptx
@@ -241,7 +241,7 @@
           <a:p>
             <a:fld id="{D86EED8F-A3C5-4AD2-862E-DB4F0FDDFF39}" type="datetimeFigureOut">
               <a:rPr lang="en-US" smtClean="0"/>
-              <a:t>9/12/2021</a:t>
+              <a:t>9/13/2021</a:t>
             </a:fld>
             <a:endParaRPr lang="en-US" dirty="0"/>
           </a:p>
@@ -778,7 +778,7 @@
           <a:p>
             <a:fld id="{58DB32FF-34E7-9545-86A2-0DF334BA82C1}" type="datetimeFigureOut">
               <a:rPr lang="en-US" smtClean="0"/>
-              <a:t>9/12/2021</a:t>
+              <a:t>9/13/2021</a:t>
             </a:fld>
             <a:endParaRPr lang="en-US" dirty="0"/>
           </a:p>
@@ -948,7 +948,7 @@
           <a:p>
             <a:fld id="{58DB32FF-34E7-9545-86A2-0DF334BA82C1}" type="datetimeFigureOut">
               <a:rPr lang="en-US" smtClean="0"/>
-              <a:t>9/12/2021</a:t>
+              <a:t>9/13/2021</a:t>
             </a:fld>
             <a:endParaRPr lang="en-US" dirty="0"/>
           </a:p>
@@ -1128,7 +1128,7 @@
           <a:p>
             <a:fld id="{58DB32FF-34E7-9545-86A2-0DF334BA82C1}" type="datetimeFigureOut">
               <a:rPr lang="en-US" smtClean="0"/>
-              <a:t>9/12/2021</a:t>
+              <a:t>9/13/2021</a:t>
             </a:fld>
             <a:endParaRPr lang="en-US" dirty="0"/>
           </a:p>
@@ -1756,7 +1756,7 @@
           <a:p>
             <a:fld id="{58DB32FF-34E7-9545-86A2-0DF334BA82C1}" type="datetimeFigureOut">
               <a:rPr lang="en-US" smtClean="0"/>
-              <a:t>9/12/2021</a:t>
+              <a:t>9/13/2021</a:t>
             </a:fld>
             <a:endParaRPr lang="en-US" dirty="0"/>
           </a:p>
@@ -1926,7 +1926,7 @@
           <a:p>
             <a:fld id="{58DB32FF-34E7-9545-86A2-0DF334BA82C1}" type="datetimeFigureOut">
               <a:rPr lang="en-US" smtClean="0"/>
-              <a:t>9/12/2021</a:t>
+              <a:t>9/13/2021</a:t>
             </a:fld>
             <a:endParaRPr lang="en-US" dirty="0"/>
           </a:p>
@@ -2172,7 +2172,7 @@
           <a:p>
             <a:fld id="{58DB32FF-34E7-9545-86A2-0DF334BA82C1}" type="datetimeFigureOut">
               <a:rPr lang="en-US" smtClean="0"/>
-              <a:t>9/12/2021</a:t>
+              <a:t>9/13/2021</a:t>
             </a:fld>
             <a:endParaRPr lang="en-US" dirty="0"/>
           </a:p>
@@ -2460,7 +2460,7 @@
           <a:p>
             <a:fld id="{58DB32FF-34E7-9545-86A2-0DF334BA82C1}" type="datetimeFigureOut">
               <a:rPr lang="en-US" smtClean="0"/>
-              <a:t>9/12/2021</a:t>
+              <a:t>9/13/2021</a:t>
             </a:fld>
             <a:endParaRPr lang="en-US" dirty="0"/>
           </a:p>
@@ -2882,7 +2882,7 @@
           <a:p>
             <a:fld id="{58DB32FF-34E7-9545-86A2-0DF334BA82C1}" type="datetimeFigureOut">
               <a:rPr lang="en-US" smtClean="0"/>
-              <a:t>9/12/2021</a:t>
+              <a:t>9/13/2021</a:t>
             </a:fld>
             <a:endParaRPr lang="en-US" dirty="0"/>
           </a:p>
@@ -3000,7 +3000,7 @@
           <a:p>
             <a:fld id="{58DB32FF-34E7-9545-86A2-0DF334BA82C1}" type="datetimeFigureOut">
               <a:rPr lang="en-US" smtClean="0"/>
-              <a:t>9/12/2021</a:t>
+              <a:t>9/13/2021</a:t>
             </a:fld>
             <a:endParaRPr lang="en-US" dirty="0"/>
           </a:p>
@@ -3095,7 +3095,7 @@
           <a:p>
             <a:fld id="{58DB32FF-34E7-9545-86A2-0DF334BA82C1}" type="datetimeFigureOut">
               <a:rPr lang="en-US" smtClean="0"/>
-              <a:t>9/12/2021</a:t>
+              <a:t>9/13/2021</a:t>
             </a:fld>
             <a:endParaRPr lang="en-US" dirty="0"/>
           </a:p>
@@ -3265,7 +3265,7 @@
           <a:p>
             <a:fld id="{58DB32FF-34E7-9545-86A2-0DF334BA82C1}" type="datetimeFigureOut">
               <a:rPr lang="en-US" smtClean="0"/>
-              <a:t>9/12/2021</a:t>
+              <a:t>9/13/2021</a:t>
             </a:fld>
             <a:endParaRPr lang="en-US" dirty="0"/>
           </a:p>
@@ -3542,7 +3542,7 @@
           <a:p>
             <a:fld id="{58DB32FF-34E7-9545-86A2-0DF334BA82C1}" type="datetimeFigureOut">
               <a:rPr lang="en-US" smtClean="0"/>
-              <a:t>9/12/2021</a:t>
+              <a:t>9/13/2021</a:t>
             </a:fld>
             <a:endParaRPr lang="en-US" dirty="0"/>
           </a:p>
@@ -3795,7 +3795,7 @@
           <a:p>
             <a:fld id="{58DB32FF-34E7-9545-86A2-0DF334BA82C1}" type="datetimeFigureOut">
               <a:rPr lang="en-US" smtClean="0"/>
-              <a:t>9/12/2021</a:t>
+              <a:t>9/13/2021</a:t>
             </a:fld>
             <a:endParaRPr lang="en-US" dirty="0"/>
           </a:p>
@@ -3965,7 +3965,7 @@
           <a:p>
             <a:fld id="{58DB32FF-34E7-9545-86A2-0DF334BA82C1}" type="datetimeFigureOut">
               <a:rPr lang="en-US" smtClean="0"/>
-              <a:t>9/12/2021</a:t>
+              <a:t>9/13/2021</a:t>
             </a:fld>
             <a:endParaRPr lang="en-US" dirty="0"/>
           </a:p>
@@ -4145,7 +4145,7 @@
           <a:p>
             <a:fld id="{58DB32FF-34E7-9545-86A2-0DF334BA82C1}" type="datetimeFigureOut">
               <a:rPr lang="en-US" smtClean="0"/>
-              <a:t>9/12/2021</a:t>
+              <a:t>9/13/2021</a:t>
             </a:fld>
             <a:endParaRPr lang="en-US" dirty="0"/>
           </a:p>
@@ -4773,7 +4773,7 @@
           <a:p>
             <a:fld id="{58DB32FF-34E7-9545-86A2-0DF334BA82C1}" type="datetimeFigureOut">
               <a:rPr lang="en-US" smtClean="0"/>
-              <a:t>9/12/2021</a:t>
+              <a:t>9/13/2021</a:t>
             </a:fld>
             <a:endParaRPr lang="en-US" dirty="0"/>
           </a:p>
@@ -4943,7 +4943,7 @@
           <a:p>
             <a:fld id="{58DB32FF-34E7-9545-86A2-0DF334BA82C1}" type="datetimeFigureOut">
               <a:rPr lang="en-US" smtClean="0"/>
-              <a:t>9/12/2021</a:t>
+              <a:t>9/13/2021</a:t>
             </a:fld>
             <a:endParaRPr lang="en-US" dirty="0"/>
           </a:p>
@@ -5189,7 +5189,7 @@
           <a:p>
             <a:fld id="{58DB32FF-34E7-9545-86A2-0DF334BA82C1}" type="datetimeFigureOut">
               <a:rPr lang="en-US" smtClean="0"/>
-              <a:t>9/12/2021</a:t>
+              <a:t>9/13/2021</a:t>
             </a:fld>
             <a:endParaRPr lang="en-US" dirty="0"/>
           </a:p>
@@ -5477,7 +5477,7 @@
           <a:p>
             <a:fld id="{58DB32FF-34E7-9545-86A2-0DF334BA82C1}" type="datetimeFigureOut">
               <a:rPr lang="en-US" smtClean="0"/>
-              <a:t>9/12/2021</a:t>
+              <a:t>9/13/2021</a:t>
             </a:fld>
             <a:endParaRPr lang="en-US" dirty="0"/>
           </a:p>
@@ -5899,7 +5899,7 @@
           <a:p>
             <a:fld id="{58DB32FF-34E7-9545-86A2-0DF334BA82C1}" type="datetimeFigureOut">
               <a:rPr lang="en-US" smtClean="0"/>
-              <a:t>9/12/2021</a:t>
+              <a:t>9/13/2021</a:t>
             </a:fld>
             <a:endParaRPr lang="en-US" dirty="0"/>
           </a:p>
@@ -6145,7 +6145,7 @@
           <a:p>
             <a:fld id="{58DB32FF-34E7-9545-86A2-0DF334BA82C1}" type="datetimeFigureOut">
               <a:rPr lang="en-US" smtClean="0"/>
-              <a:t>9/12/2021</a:t>
+              <a:t>9/13/2021</a:t>
             </a:fld>
             <a:endParaRPr lang="en-US" dirty="0"/>
           </a:p>
@@ -6263,7 +6263,7 @@
           <a:p>
             <a:fld id="{58DB32FF-34E7-9545-86A2-0DF334BA82C1}" type="datetimeFigureOut">
               <a:rPr lang="en-US" smtClean="0"/>
-              <a:t>9/12/2021</a:t>
+              <a:t>9/13/2021</a:t>
             </a:fld>
             <a:endParaRPr lang="en-US" dirty="0"/>
           </a:p>
@@ -6358,7 +6358,7 @@
           <a:p>
             <a:fld id="{58DB32FF-34E7-9545-86A2-0DF334BA82C1}" type="datetimeFigureOut">
               <a:rPr lang="en-US" smtClean="0"/>
-              <a:t>9/12/2021</a:t>
+              <a:t>9/13/2021</a:t>
             </a:fld>
             <a:endParaRPr lang="en-US" dirty="0"/>
           </a:p>
@@ -6635,7 +6635,7 @@
           <a:p>
             <a:fld id="{58DB32FF-34E7-9545-86A2-0DF334BA82C1}" type="datetimeFigureOut">
               <a:rPr lang="en-US" smtClean="0"/>
-              <a:t>9/12/2021</a:t>
+              <a:t>9/13/2021</a:t>
             </a:fld>
             <a:endParaRPr lang="en-US" dirty="0"/>
           </a:p>
@@ -6888,7 +6888,7 @@
           <a:p>
             <a:fld id="{58DB32FF-34E7-9545-86A2-0DF334BA82C1}" type="datetimeFigureOut">
               <a:rPr lang="en-US" smtClean="0"/>
-              <a:t>9/12/2021</a:t>
+              <a:t>9/13/2021</a:t>
             </a:fld>
             <a:endParaRPr lang="en-US" dirty="0"/>
           </a:p>
@@ -7058,7 +7058,7 @@
           <a:p>
             <a:fld id="{58DB32FF-34E7-9545-86A2-0DF334BA82C1}" type="datetimeFigureOut">
               <a:rPr lang="en-US" smtClean="0"/>
-              <a:t>9/12/2021</a:t>
+              <a:t>9/13/2021</a:t>
             </a:fld>
             <a:endParaRPr lang="en-US" dirty="0"/>
           </a:p>
@@ -7238,7 +7238,7 @@
           <a:p>
             <a:fld id="{58DB32FF-34E7-9545-86A2-0DF334BA82C1}" type="datetimeFigureOut">
               <a:rPr lang="en-US" smtClean="0"/>
-              <a:t>9/12/2021</a:t>
+              <a:t>9/13/2021</a:t>
             </a:fld>
             <a:endParaRPr lang="en-US" dirty="0"/>
           </a:p>
@@ -7755,7 +7755,7 @@
           <a:p>
             <a:fld id="{58DB32FF-34E7-9545-86A2-0DF334BA82C1}" type="datetimeFigureOut">
               <a:rPr lang="en-US" smtClean="0"/>
-              <a:t>9/12/2021</a:t>
+              <a:t>9/13/2021</a:t>
             </a:fld>
             <a:endParaRPr lang="en-US" dirty="0"/>
           </a:p>
@@ -7925,7 +7925,7 @@
           <a:p>
             <a:fld id="{58DB32FF-34E7-9545-86A2-0DF334BA82C1}" type="datetimeFigureOut">
               <a:rPr lang="en-US" smtClean="0"/>
-              <a:t>9/12/2021</a:t>
+              <a:t>9/13/2021</a:t>
             </a:fld>
             <a:endParaRPr lang="en-US" dirty="0"/>
           </a:p>
@@ -8171,7 +8171,7 @@
           <a:p>
             <a:fld id="{58DB32FF-34E7-9545-86A2-0DF334BA82C1}" type="datetimeFigureOut">
               <a:rPr lang="en-US" smtClean="0"/>
-              <a:t>9/12/2021</a:t>
+              <a:t>9/13/2021</a:t>
             </a:fld>
             <a:endParaRPr lang="en-US" dirty="0"/>
           </a:p>
@@ -8459,7 +8459,7 @@
           <a:p>
             <a:fld id="{58DB32FF-34E7-9545-86A2-0DF334BA82C1}" type="datetimeFigureOut">
               <a:rPr lang="en-US" smtClean="0"/>
-              <a:t>9/12/2021</a:t>
+              <a:t>9/13/2021</a:t>
             </a:fld>
             <a:endParaRPr lang="en-US" dirty="0"/>
           </a:p>
@@ -8747,7 +8747,7 @@
           <a:p>
             <a:fld id="{58DB32FF-34E7-9545-86A2-0DF334BA82C1}" type="datetimeFigureOut">
               <a:rPr lang="en-US" smtClean="0"/>
-              <a:t>9/12/2021</a:t>
+              <a:t>9/13/2021</a:t>
             </a:fld>
             <a:endParaRPr lang="en-US" dirty="0"/>
           </a:p>
@@ -9169,7 +9169,7 @@
           <a:p>
             <a:fld id="{58DB32FF-34E7-9545-86A2-0DF334BA82C1}" type="datetimeFigureOut">
               <a:rPr lang="en-US" smtClean="0"/>
-              <a:t>9/12/2021</a:t>
+              <a:t>9/13/2021</a:t>
             </a:fld>
             <a:endParaRPr lang="en-US" dirty="0"/>
           </a:p>
@@ -9287,7 +9287,7 @@
           <a:p>
             <a:fld id="{58DB32FF-34E7-9545-86A2-0DF334BA82C1}" type="datetimeFigureOut">
               <a:rPr lang="en-US" smtClean="0"/>
-              <a:t>9/12/2021</a:t>
+              <a:t>9/13/2021</a:t>
             </a:fld>
             <a:endParaRPr lang="en-US" dirty="0"/>
           </a:p>
@@ -9382,7 +9382,7 @@
           <a:p>
             <a:fld id="{58DB32FF-34E7-9545-86A2-0DF334BA82C1}" type="datetimeFigureOut">
               <a:rPr lang="en-US" smtClean="0"/>
-              <a:t>9/12/2021</a:t>
+              <a:t>9/13/2021</a:t>
             </a:fld>
             <a:endParaRPr lang="en-US" dirty="0"/>
           </a:p>
@@ -9659,7 +9659,7 @@
           <a:p>
             <a:fld id="{58DB32FF-34E7-9545-86A2-0DF334BA82C1}" type="datetimeFigureOut">
               <a:rPr lang="en-US" smtClean="0"/>
-              <a:t>9/12/2021</a:t>
+              <a:t>9/13/2021</a:t>
             </a:fld>
             <a:endParaRPr lang="en-US" dirty="0"/>
           </a:p>
@@ -9912,7 +9912,7 @@
           <a:p>
             <a:fld id="{58DB32FF-34E7-9545-86A2-0DF334BA82C1}" type="datetimeFigureOut">
               <a:rPr lang="en-US" smtClean="0"/>
-              <a:t>9/12/2021</a:t>
+              <a:t>9/13/2021</a:t>
             </a:fld>
             <a:endParaRPr lang="en-US" dirty="0"/>
           </a:p>
@@ -10082,7 +10082,7 @@
           <a:p>
             <a:fld id="{58DB32FF-34E7-9545-86A2-0DF334BA82C1}" type="datetimeFigureOut">
               <a:rPr lang="en-US" smtClean="0"/>
-              <a:t>9/12/2021</a:t>
+              <a:t>9/13/2021</a:t>
             </a:fld>
             <a:endParaRPr lang="en-US" dirty="0"/>
           </a:p>
@@ -10262,7 +10262,7 @@
           <a:p>
             <a:fld id="{58DB32FF-34E7-9545-86A2-0DF334BA82C1}" type="datetimeFigureOut">
               <a:rPr lang="en-US" smtClean="0"/>
-              <a:t>9/12/2021</a:t>
+              <a:t>9/13/2021</a:t>
             </a:fld>
             <a:endParaRPr lang="en-US" dirty="0"/>
           </a:p>
@@ -10853,7 +10853,7 @@
           <a:p>
             <a:fld id="{58DB32FF-34E7-9545-86A2-0DF334BA82C1}" type="datetimeFigureOut">
               <a:rPr lang="en-US" smtClean="0"/>
-              <a:t>9/12/2021</a:t>
+              <a:t>9/13/2021</a:t>
             </a:fld>
             <a:endParaRPr lang="en-US" dirty="0"/>
           </a:p>
@@ -11275,7 +11275,7 @@
           <a:p>
             <a:fld id="{58DB32FF-34E7-9545-86A2-0DF334BA82C1}" type="datetimeFigureOut">
               <a:rPr lang="en-US" smtClean="0"/>
-              <a:t>9/12/2021</a:t>
+              <a:t>9/13/2021</a:t>
             </a:fld>
             <a:endParaRPr lang="en-US" dirty="0"/>
           </a:p>
@@ -11445,7 +11445,7 @@
           <a:p>
             <a:fld id="{58DB32FF-34E7-9545-86A2-0DF334BA82C1}" type="datetimeFigureOut">
               <a:rPr lang="en-US" smtClean="0"/>
-              <a:t>9/12/2021</a:t>
+              <a:t>9/13/2021</a:t>
             </a:fld>
             <a:endParaRPr lang="en-US" dirty="0"/>
           </a:p>
@@ -11691,7 +11691,7 @@
           <a:p>
             <a:fld id="{58DB32FF-34E7-9545-86A2-0DF334BA82C1}" type="datetimeFigureOut">
               <a:rPr lang="en-US" smtClean="0"/>
-              <a:t>9/12/2021</a:t>
+              <a:t>9/13/2021</a:t>
             </a:fld>
             <a:endParaRPr lang="en-US" dirty="0"/>
           </a:p>
@@ -11979,7 +11979,7 @@
           <a:p>
             <a:fld id="{58DB32FF-34E7-9545-86A2-0DF334BA82C1}" type="datetimeFigureOut">
               <a:rPr lang="en-US" smtClean="0"/>
-              <a:t>9/12/2021</a:t>
+              <a:t>9/13/2021</a:t>
             </a:fld>
             <a:endParaRPr lang="en-US" dirty="0"/>
           </a:p>
@@ -12401,7 +12401,7 @@
           <a:p>
             <a:fld id="{58DB32FF-34E7-9545-86A2-0DF334BA82C1}" type="datetimeFigureOut">
               <a:rPr lang="en-US" smtClean="0"/>
-              <a:t>9/12/2021</a:t>
+              <a:t>9/13/2021</a:t>
             </a:fld>
             <a:endParaRPr lang="en-US" dirty="0"/>
           </a:p>
@@ -12519,7 +12519,7 @@
           <a:p>
             <a:fld id="{58DB32FF-34E7-9545-86A2-0DF334BA82C1}" type="datetimeFigureOut">
               <a:rPr lang="en-US" smtClean="0"/>
-              <a:t>9/12/2021</a:t>
+              <a:t>9/13/2021</a:t>
             </a:fld>
             <a:endParaRPr lang="en-US" dirty="0"/>
           </a:p>
@@ -12614,7 +12614,7 @@
           <a:p>
             <a:fld id="{58DB32FF-34E7-9545-86A2-0DF334BA82C1}" type="datetimeFigureOut">
               <a:rPr lang="en-US" smtClean="0"/>
-              <a:t>9/12/2021</a:t>
+              <a:t>9/13/2021</a:t>
             </a:fld>
             <a:endParaRPr lang="en-US" dirty="0"/>
           </a:p>
@@ -12891,7 +12891,7 @@
           <a:p>
             <a:fld id="{58DB32FF-34E7-9545-86A2-0DF334BA82C1}" type="datetimeFigureOut">
               <a:rPr lang="en-US" smtClean="0"/>
-              <a:t>9/12/2021</a:t>
+              <a:t>9/13/2021</a:t>
             </a:fld>
             <a:endParaRPr lang="en-US" dirty="0"/>
           </a:p>
@@ -13144,7 +13144,7 @@
           <a:p>
             <a:fld id="{58DB32FF-34E7-9545-86A2-0DF334BA82C1}" type="datetimeFigureOut">
               <a:rPr lang="en-US" smtClean="0"/>
-              <a:t>9/12/2021</a:t>
+              <a:t>9/13/2021</a:t>
             </a:fld>
             <a:endParaRPr lang="en-US" dirty="0"/>
           </a:p>
@@ -13314,7 +13314,7 @@
           <a:p>
             <a:fld id="{58DB32FF-34E7-9545-86A2-0DF334BA82C1}" type="datetimeFigureOut">
               <a:rPr lang="en-US" smtClean="0"/>
-              <a:t>9/12/2021</a:t>
+              <a:t>9/13/2021</a:t>
             </a:fld>
             <a:endParaRPr lang="en-US" dirty="0"/>
           </a:p>
@@ -13494,7 +13494,7 @@
           <a:p>
             <a:fld id="{58DB32FF-34E7-9545-86A2-0DF334BA82C1}" type="datetimeFigureOut">
               <a:rPr lang="en-US" smtClean="0"/>
-              <a:t>9/12/2021</a:t>
+              <a:t>9/13/2021</a:t>
             </a:fld>
             <a:endParaRPr lang="en-US" dirty="0"/>
           </a:p>
@@ -13612,7 +13612,7 @@
           <a:p>
             <a:fld id="{58DB32FF-34E7-9545-86A2-0DF334BA82C1}" type="datetimeFigureOut">
               <a:rPr lang="en-US" smtClean="0"/>
-              <a:t>9/12/2021</a:t>
+              <a:t>9/13/2021</a:t>
             </a:fld>
             <a:endParaRPr lang="en-US" dirty="0"/>
           </a:p>
@@ -14203,7 +14203,7 @@
           <a:p>
             <a:fld id="{58DB32FF-34E7-9545-86A2-0DF334BA82C1}" type="datetimeFigureOut">
               <a:rPr lang="en-US" smtClean="0"/>
-              <a:t>9/12/2021</a:t>
+              <a:t>9/13/2021</a:t>
             </a:fld>
             <a:endParaRPr lang="en-US" dirty="0"/>
           </a:p>
@@ -14373,7 +14373,7 @@
           <a:p>
             <a:fld id="{58DB32FF-34E7-9545-86A2-0DF334BA82C1}" type="datetimeFigureOut">
               <a:rPr lang="en-US" smtClean="0"/>
-              <a:t>9/12/2021</a:t>
+              <a:t>9/13/2021</a:t>
             </a:fld>
             <a:endParaRPr lang="en-US" dirty="0"/>
           </a:p>
@@ -14619,7 +14619,7 @@
           <a:p>
             <a:fld id="{58DB32FF-34E7-9545-86A2-0DF334BA82C1}" type="datetimeFigureOut">
               <a:rPr lang="en-US" smtClean="0"/>
-              <a:t>9/12/2021</a:t>
+              <a:t>9/13/2021</a:t>
             </a:fld>
             <a:endParaRPr lang="en-US" dirty="0"/>
           </a:p>
@@ -14907,7 +14907,7 @@
           <a:p>
             <a:fld id="{58DB32FF-34E7-9545-86A2-0DF334BA82C1}" type="datetimeFigureOut">
               <a:rPr lang="en-US" smtClean="0"/>
-              <a:t>9/12/2021</a:t>
+              <a:t>9/13/2021</a:t>
             </a:fld>
             <a:endParaRPr lang="en-US" dirty="0"/>
           </a:p>
@@ -15329,7 +15329,7 @@
           <a:p>
             <a:fld id="{58DB32FF-34E7-9545-86A2-0DF334BA82C1}" type="datetimeFigureOut">
               <a:rPr lang="en-US" smtClean="0"/>
-              <a:t>9/12/2021</a:t>
+              <a:t>9/13/2021</a:t>
             </a:fld>
             <a:endParaRPr lang="en-US" dirty="0"/>
           </a:p>
@@ -15447,7 +15447,7 @@
           <a:p>
             <a:fld id="{58DB32FF-34E7-9545-86A2-0DF334BA82C1}" type="datetimeFigureOut">
               <a:rPr lang="en-US" smtClean="0"/>
-              <a:t>9/12/2021</a:t>
+              <a:t>9/13/2021</a:t>
             </a:fld>
             <a:endParaRPr lang="en-US" dirty="0"/>
           </a:p>
@@ -15542,7 +15542,7 @@
           <a:p>
             <a:fld id="{58DB32FF-34E7-9545-86A2-0DF334BA82C1}" type="datetimeFigureOut">
               <a:rPr lang="en-US" smtClean="0"/>
-              <a:t>9/12/2021</a:t>
+              <a:t>9/13/2021</a:t>
             </a:fld>
             <a:endParaRPr lang="en-US" dirty="0"/>
           </a:p>
@@ -15819,7 +15819,7 @@
           <a:p>
             <a:fld id="{58DB32FF-34E7-9545-86A2-0DF334BA82C1}" type="datetimeFigureOut">
               <a:rPr lang="en-US" smtClean="0"/>
-              <a:t>9/12/2021</a:t>
+              <a:t>9/13/2021</a:t>
             </a:fld>
             <a:endParaRPr lang="en-US" dirty="0"/>
           </a:p>
@@ -16072,7 +16072,7 @@
           <a:p>
             <a:fld id="{58DB32FF-34E7-9545-86A2-0DF334BA82C1}" type="datetimeFigureOut">
               <a:rPr lang="en-US" smtClean="0"/>
-              <a:t>9/12/2021</a:t>
+              <a:t>9/13/2021</a:t>
             </a:fld>
             <a:endParaRPr lang="en-US" dirty="0"/>
           </a:p>
@@ -16167,7 +16167,7 @@
           <a:p>
             <a:fld id="{58DB32FF-34E7-9545-86A2-0DF334BA82C1}" type="datetimeFigureOut">
               <a:rPr lang="en-US" smtClean="0"/>
-              <a:t>9/12/2021</a:t>
+              <a:t>9/13/2021</a:t>
             </a:fld>
             <a:endParaRPr lang="en-US" dirty="0"/>
           </a:p>
@@ -16337,7 +16337,7 @@
           <a:p>
             <a:fld id="{58DB32FF-34E7-9545-86A2-0DF334BA82C1}" type="datetimeFigureOut">
               <a:rPr lang="en-US" smtClean="0"/>
-              <a:t>9/12/2021</a:t>
+              <a:t>9/13/2021</a:t>
             </a:fld>
             <a:endParaRPr lang="en-US" dirty="0"/>
           </a:p>
@@ -16517,7 +16517,7 @@
           <a:p>
             <a:fld id="{58DB32FF-34E7-9545-86A2-0DF334BA82C1}" type="datetimeFigureOut">
               <a:rPr lang="en-US" smtClean="0"/>
-              <a:t>9/12/2021</a:t>
+              <a:t>9/13/2021</a:t>
             </a:fld>
             <a:endParaRPr lang="en-US" dirty="0"/>
           </a:p>
@@ -17143,7 +17143,7 @@
           <a:p>
             <a:fld id="{58DB32FF-34E7-9545-86A2-0DF334BA82C1}" type="datetimeFigureOut">
               <a:rPr lang="en-US" smtClean="0"/>
-              <a:t>9/12/2021</a:t>
+              <a:t>9/13/2021</a:t>
             </a:fld>
             <a:endParaRPr lang="en-US" dirty="0"/>
           </a:p>
@@ -17396,7 +17396,7 @@
           <a:p>
             <a:fld id="{58DB32FF-34E7-9545-86A2-0DF334BA82C1}" type="datetimeFigureOut">
               <a:rPr lang="en-US" smtClean="0"/>
-              <a:t>9/12/2021</a:t>
+              <a:t>9/13/2021</a:t>
             </a:fld>
             <a:endParaRPr lang="en-US" dirty="0"/>
           </a:p>
@@ -22842,7 +22842,7 @@
                   </a:outerShdw>
                 </a:effectLst>
               </a:rPr>
-              <a:t>1-Data Analysis And Preprocessing</a:t>
+              <a:t>1-Data Preprocessing</a:t>
             </a:r>
           </a:p>
         </p:txBody>
@@ -22922,8 +22922,8 @@
         </p:nvSpPr>
         <p:spPr>
           <a:xfrm>
-            <a:off x="94848" y="32223388"/>
-            <a:ext cx="12375312" cy="1107996"/>
+            <a:off x="13921907" y="34242171"/>
+            <a:ext cx="14791534" cy="1107996"/>
           </a:xfrm>
           <a:prstGeom prst="rect">
             <a:avLst/>
@@ -23429,7 +23429,7 @@
         </p:nvSpPr>
         <p:spPr>
           <a:xfrm>
-            <a:off x="316160" y="43786113"/>
+            <a:off x="229474" y="42957614"/>
             <a:ext cx="13108112" cy="1107996"/>
           </a:xfrm>
           <a:prstGeom prst="rect">
@@ -23490,8 +23490,8 @@
         </p:nvSpPr>
         <p:spPr>
           <a:xfrm>
-            <a:off x="229474" y="45103593"/>
-            <a:ext cx="13108113" cy="6035040"/>
+            <a:off x="229474" y="44702854"/>
+            <a:ext cx="13108113" cy="6400800"/>
           </a:xfrm>
           <a:prstGeom prst="rect">
             <a:avLst/>
@@ -23512,7 +23512,7 @@
           </a:fontRef>
         </p:style>
         <p:txBody>
-          <a:bodyPr wrap="square" rtlCol="0">
+          <a:bodyPr wrap="square" tIns="914400" rtlCol="0">
             <a:spAutoFit/>
           </a:bodyPr>
           <a:lstStyle/>
@@ -23831,8 +23831,8 @@
         </p:blipFill>
         <p:spPr bwMode="auto">
           <a:xfrm>
-            <a:off x="94848" y="33446695"/>
-            <a:ext cx="13108111" cy="9509506"/>
+            <a:off x="14006726" y="35450342"/>
+            <a:ext cx="14588890" cy="6169700"/>
           </a:xfrm>
           <a:prstGeom prst="rect">
             <a:avLst/>
@@ -23867,8 +23867,8 @@
         </p:blipFill>
         <p:spPr bwMode="auto">
           <a:xfrm>
-            <a:off x="13718693" y="28895750"/>
-            <a:ext cx="15447258" cy="12351085"/>
+            <a:off x="13718693" y="28895751"/>
+            <a:ext cx="15447258" cy="5132386"/>
           </a:xfrm>
           <a:prstGeom prst="rect">
             <a:avLst/>
@@ -23879,6 +23879,445 @@
           </a:ln>
         </p:spPr>
       </p:pic>
+      <p:sp>
+        <p:nvSpPr>
+          <p:cNvPr id="40" name="TextBox 39">
+            <a:extLst>
+              <a:ext uri="{FF2B5EF4-FFF2-40B4-BE49-F238E27FC236}">
+                <a16:creationId xmlns:a16="http://schemas.microsoft.com/office/drawing/2014/main" id="{650AE651-A1A1-4FC9-8481-C78307C96550}"/>
+              </a:ext>
+            </a:extLst>
+          </p:cNvPr>
+          <p:cNvSpPr txBox="1"/>
+          <p:nvPr/>
+        </p:nvSpPr>
+        <p:spPr>
+          <a:xfrm>
+            <a:off x="316160" y="32128145"/>
+            <a:ext cx="12154000" cy="1107996"/>
+          </a:xfrm>
+          <a:prstGeom prst="rect">
+            <a:avLst/>
+          </a:prstGeom>
+        </p:spPr>
+        <p:style>
+          <a:lnRef idx="0">
+            <a:schemeClr val="accent2"/>
+          </a:lnRef>
+          <a:fillRef idx="3">
+            <a:schemeClr val="accent2"/>
+          </a:fillRef>
+          <a:effectRef idx="3">
+            <a:schemeClr val="accent2"/>
+          </a:effectRef>
+          <a:fontRef idx="minor">
+            <a:schemeClr val="lt1"/>
+          </a:fontRef>
+        </p:style>
+        <p:txBody>
+          <a:bodyPr wrap="square" rtlCol="0">
+            <a:spAutoFit/>
+          </a:bodyPr>
+          <a:lstStyle/>
+          <a:p>
+            <a:pPr algn="ctr"/>
+            <a:r>
+              <a:rPr lang="en-US" sz="6600" dirty="0">
+                <a:ln w="0"/>
+                <a:solidFill>
+                  <a:schemeClr val="accent1"/>
+                </a:solidFill>
+                <a:effectLst>
+                  <a:outerShdw blurRad="38100" dist="25400" dir="5400000" algn="ctr" rotWithShape="0">
+                    <a:srgbClr val="6E747A">
+                      <a:alpha val="43000"/>
+                    </a:srgbClr>
+                  </a:outerShdw>
+                </a:effectLst>
+              </a:rPr>
+              <a:t>Algorithms used</a:t>
+            </a:r>
+          </a:p>
+        </p:txBody>
+      </p:sp>
+      <p:sp>
+        <p:nvSpPr>
+          <p:cNvPr id="41" name="TextBox 40">
+            <a:extLst>
+              <a:ext uri="{FF2B5EF4-FFF2-40B4-BE49-F238E27FC236}">
+                <a16:creationId xmlns:a16="http://schemas.microsoft.com/office/drawing/2014/main" id="{284E2A27-B407-4D65-8D04-FB952CA8FB71}"/>
+              </a:ext>
+            </a:extLst>
+          </p:cNvPr>
+          <p:cNvSpPr txBox="1"/>
+          <p:nvPr/>
+        </p:nvSpPr>
+        <p:spPr>
+          <a:xfrm>
+            <a:off x="229474" y="33526109"/>
+            <a:ext cx="12154000" cy="8168390"/>
+          </a:xfrm>
+          <a:prstGeom prst="rect">
+            <a:avLst/>
+          </a:prstGeom>
+        </p:spPr>
+        <p:style>
+          <a:lnRef idx="0">
+            <a:schemeClr val="accent2"/>
+          </a:lnRef>
+          <a:fillRef idx="3">
+            <a:schemeClr val="accent2"/>
+          </a:fillRef>
+          <a:effectRef idx="3">
+            <a:schemeClr val="accent2"/>
+          </a:effectRef>
+          <a:fontRef idx="minor">
+            <a:schemeClr val="lt1"/>
+          </a:fontRef>
+        </p:style>
+        <p:txBody>
+          <a:bodyPr wrap="square" tIns="822960" rtlCol="0">
+            <a:spAutoFit/>
+          </a:bodyPr>
+          <a:lstStyle/>
+          <a:p>
+            <a:pPr marL="571500" indent="-571500" algn="ctr">
+              <a:lnSpc>
+                <a:spcPct val="150000"/>
+              </a:lnSpc>
+              <a:buFont typeface="Arial" panose="020B0604020202020204" pitchFamily="34" charset="0"/>
+              <a:buChar char="•"/>
+            </a:pPr>
+            <a:r>
+              <a:rPr lang="en-US" sz="4000" dirty="0">
+                <a:ln w="0"/>
+                <a:solidFill>
+                  <a:schemeClr val="tx1"/>
+                </a:solidFill>
+                <a:effectLst>
+                  <a:outerShdw blurRad="38100" dist="38100" dir="2700000" algn="tl">
+                    <a:srgbClr val="000000">
+                      <a:alpha val="43137"/>
+                    </a:srgbClr>
+                  </a:outerShdw>
+                </a:effectLst>
+              </a:rPr>
+              <a:t>ARIMA</a:t>
+            </a:r>
+          </a:p>
+          <a:p>
+            <a:pPr marL="571500" indent="-571500" algn="ctr">
+              <a:lnSpc>
+                <a:spcPct val="150000"/>
+              </a:lnSpc>
+              <a:buFont typeface="Arial" panose="020B0604020202020204" pitchFamily="34" charset="0"/>
+              <a:buChar char="•"/>
+            </a:pPr>
+            <a:r>
+              <a:rPr lang="en-US" sz="4000" dirty="0">
+                <a:ln w="0"/>
+                <a:solidFill>
+                  <a:schemeClr val="tx1"/>
+                </a:solidFill>
+                <a:effectLst>
+                  <a:outerShdw blurRad="38100" dist="38100" dir="2700000" algn="tl">
+                    <a:srgbClr val="000000">
+                      <a:alpha val="43137"/>
+                    </a:srgbClr>
+                  </a:outerShdw>
+                </a:effectLst>
+              </a:rPr>
+              <a:t>ARMA</a:t>
+            </a:r>
+          </a:p>
+          <a:p>
+            <a:pPr marL="571500" indent="-571500" algn="ctr">
+              <a:lnSpc>
+                <a:spcPct val="150000"/>
+              </a:lnSpc>
+              <a:buFont typeface="Arial" panose="020B0604020202020204" pitchFamily="34" charset="0"/>
+              <a:buChar char="•"/>
+            </a:pPr>
+            <a:r>
+              <a:rPr lang="en-US" sz="4000" dirty="0">
+                <a:ln w="0"/>
+                <a:solidFill>
+                  <a:schemeClr val="tx1"/>
+                </a:solidFill>
+                <a:effectLst>
+                  <a:outerShdw blurRad="38100" dist="38100" dir="2700000" algn="tl">
+                    <a:srgbClr val="000000">
+                      <a:alpha val="43137"/>
+                    </a:srgbClr>
+                  </a:outerShdw>
+                </a:effectLst>
+              </a:rPr>
+              <a:t>Simple Exponential Smoothing “SES”</a:t>
+            </a:r>
+          </a:p>
+          <a:p>
+            <a:pPr marL="571500" indent="-571500" algn="ctr">
+              <a:lnSpc>
+                <a:spcPct val="150000"/>
+              </a:lnSpc>
+              <a:buFont typeface="Arial" panose="020B0604020202020204" pitchFamily="34" charset="0"/>
+              <a:buChar char="•"/>
+            </a:pPr>
+            <a:r>
+              <a:rPr lang="en-US" sz="4000" dirty="0">
+                <a:ln w="0"/>
+                <a:solidFill>
+                  <a:schemeClr val="tx1"/>
+                </a:solidFill>
+                <a:effectLst>
+                  <a:outerShdw blurRad="38100" dist="38100" dir="2700000" algn="tl">
+                    <a:srgbClr val="000000">
+                      <a:alpha val="43137"/>
+                    </a:srgbClr>
+                  </a:outerShdw>
+                </a:effectLst>
+              </a:rPr>
+              <a:t>Long Short Term Memory ‘LSTM’</a:t>
+            </a:r>
+          </a:p>
+          <a:p>
+            <a:pPr marL="571500" indent="-571500" algn="ctr">
+              <a:lnSpc>
+                <a:spcPct val="150000"/>
+              </a:lnSpc>
+              <a:buFont typeface="Arial" panose="020B0604020202020204" pitchFamily="34" charset="0"/>
+              <a:buChar char="•"/>
+            </a:pPr>
+            <a:r>
+              <a:rPr lang="en-US" sz="4000" dirty="0">
+                <a:ln w="0"/>
+                <a:solidFill>
+                  <a:schemeClr val="tx1"/>
+                </a:solidFill>
+                <a:effectLst>
+                  <a:outerShdw blurRad="38100" dist="38100" dir="2700000" algn="tl">
+                    <a:srgbClr val="000000">
+                      <a:alpha val="43137"/>
+                    </a:srgbClr>
+                  </a:outerShdw>
+                </a:effectLst>
+              </a:rPr>
+              <a:t>XGBosst Regression</a:t>
+            </a:r>
+          </a:p>
+          <a:p>
+            <a:pPr marL="571500" indent="-571500" algn="ctr">
+              <a:lnSpc>
+                <a:spcPct val="150000"/>
+              </a:lnSpc>
+              <a:buFont typeface="Arial" panose="020B0604020202020204" pitchFamily="34" charset="0"/>
+              <a:buChar char="•"/>
+            </a:pPr>
+            <a:r>
+              <a:rPr lang="en-US" sz="4000" dirty="0">
+                <a:ln w="0"/>
+                <a:solidFill>
+                  <a:schemeClr val="tx1"/>
+                </a:solidFill>
+                <a:effectLst>
+                  <a:outerShdw blurRad="38100" dist="38100" dir="2700000" algn="tl">
+                    <a:srgbClr val="000000">
+                      <a:alpha val="43137"/>
+                    </a:srgbClr>
+                  </a:outerShdw>
+                </a:effectLst>
+              </a:rPr>
+              <a:t>Gated recurrent Unit “GRU”</a:t>
+            </a:r>
+          </a:p>
+          <a:p>
+            <a:pPr marL="571500" indent="-571500" algn="ctr">
+              <a:lnSpc>
+                <a:spcPct val="150000"/>
+              </a:lnSpc>
+              <a:buFont typeface="Arial" panose="020B0604020202020204" pitchFamily="34" charset="0"/>
+              <a:buChar char="•"/>
+            </a:pPr>
+            <a:r>
+              <a:rPr lang="en-US" sz="4000" dirty="0">
+                <a:ln w="0"/>
+                <a:solidFill>
+                  <a:schemeClr val="tx1"/>
+                </a:solidFill>
+                <a:effectLst>
+                  <a:outerShdw blurRad="38100" dist="38100" dir="2700000" algn="tl">
+                    <a:srgbClr val="000000">
+                      <a:alpha val="43137"/>
+                    </a:srgbClr>
+                  </a:outerShdw>
+                </a:effectLst>
+              </a:rPr>
+              <a:t>We used </a:t>
+            </a:r>
+            <a:r>
+              <a:rPr lang="en-US" sz="4000">
+                <a:ln w="0"/>
+                <a:solidFill>
+                  <a:schemeClr val="tx1"/>
+                </a:solidFill>
+                <a:effectLst>
+                  <a:outerShdw blurRad="38100" dist="38100" dir="2700000" algn="tl">
+                    <a:srgbClr val="000000">
+                      <a:alpha val="43137"/>
+                    </a:srgbClr>
+                  </a:outerShdw>
+                </a:effectLst>
+              </a:rPr>
+              <a:t>best Algorithms Model </a:t>
+            </a:r>
+            <a:r>
+              <a:rPr lang="en-US" sz="4000" dirty="0">
+                <a:ln w="0"/>
+                <a:solidFill>
+                  <a:schemeClr val="tx1"/>
+                </a:solidFill>
+                <a:effectLst>
+                  <a:outerShdw blurRad="38100" dist="38100" dir="2700000" algn="tl">
+                    <a:srgbClr val="000000">
+                      <a:alpha val="43137"/>
+                    </a:srgbClr>
+                  </a:outerShdw>
+                </a:effectLst>
+              </a:rPr>
+              <a:t>For Datasets to be shown</a:t>
+            </a:r>
+            <a:r>
+              <a:rPr lang="en-US" sz="4000" dirty="0">
+                <a:ln w="0"/>
+                <a:solidFill>
+                  <a:schemeClr val="tx1"/>
+                </a:solidFill>
+              </a:rPr>
+              <a:t>:</a:t>
+            </a:r>
+          </a:p>
+        </p:txBody>
+      </p:sp>
+      <p:sp>
+        <p:nvSpPr>
+          <p:cNvPr id="42" name="TextBox 41">
+            <a:extLst>
+              <a:ext uri="{FF2B5EF4-FFF2-40B4-BE49-F238E27FC236}">
+                <a16:creationId xmlns:a16="http://schemas.microsoft.com/office/drawing/2014/main" id="{B2A0EE2F-6142-4AEE-9BEE-937FEB187F85}"/>
+              </a:ext>
+            </a:extLst>
+          </p:cNvPr>
+          <p:cNvSpPr txBox="1"/>
+          <p:nvPr/>
+        </p:nvSpPr>
+        <p:spPr>
+          <a:xfrm>
+            <a:off x="24307694" y="29312021"/>
+            <a:ext cx="4287922" cy="523220"/>
+          </a:xfrm>
+          <a:prstGeom prst="rect">
+            <a:avLst/>
+          </a:prstGeom>
+        </p:spPr>
+        <p:style>
+          <a:lnRef idx="0">
+            <a:schemeClr val="accent2"/>
+          </a:lnRef>
+          <a:fillRef idx="3">
+            <a:schemeClr val="accent2"/>
+          </a:fillRef>
+          <a:effectRef idx="3">
+            <a:schemeClr val="accent2"/>
+          </a:effectRef>
+          <a:fontRef idx="minor">
+            <a:schemeClr val="lt1"/>
+          </a:fontRef>
+        </p:style>
+        <p:txBody>
+          <a:bodyPr wrap="square" rtlCol="0">
+            <a:spAutoFit/>
+          </a:bodyPr>
+          <a:lstStyle/>
+          <a:p>
+            <a:r>
+              <a:rPr lang="en-US" sz="2800" dirty="0">
+                <a:ln w="0"/>
+                <a:solidFill>
+                  <a:schemeClr val="accent1"/>
+                </a:solidFill>
+                <a:effectLst>
+                  <a:outerShdw blurRad="38100" dist="25400" dir="5400000" algn="ctr" rotWithShape="0">
+                    <a:srgbClr val="6E747A">
+                      <a:alpha val="43000"/>
+                    </a:srgbClr>
+                  </a:outerShdw>
+                </a:effectLst>
+              </a:rPr>
+              <a:t>Mean Square Error : 15.42</a:t>
+            </a:r>
+          </a:p>
+        </p:txBody>
+      </p:sp>
+      <p:sp>
+        <p:nvSpPr>
+          <p:cNvPr id="48" name="TextBox 47">
+            <a:extLst>
+              <a:ext uri="{FF2B5EF4-FFF2-40B4-BE49-F238E27FC236}">
+                <a16:creationId xmlns:a16="http://schemas.microsoft.com/office/drawing/2014/main" id="{72F5F975-C69B-49F3-B436-02C16E77985C}"/>
+              </a:ext>
+            </a:extLst>
+          </p:cNvPr>
+          <p:cNvSpPr txBox="1"/>
+          <p:nvPr/>
+        </p:nvSpPr>
+        <p:spPr>
+          <a:xfrm>
+            <a:off x="24078085" y="36133115"/>
+            <a:ext cx="4287922" cy="523220"/>
+          </a:xfrm>
+          <a:prstGeom prst="rect">
+            <a:avLst/>
+          </a:prstGeom>
+        </p:spPr>
+        <p:style>
+          <a:lnRef idx="0">
+            <a:schemeClr val="accent2"/>
+          </a:lnRef>
+          <a:fillRef idx="3">
+            <a:schemeClr val="accent2"/>
+          </a:fillRef>
+          <a:effectRef idx="3">
+            <a:schemeClr val="accent2"/>
+          </a:effectRef>
+          <a:fontRef idx="minor">
+            <a:schemeClr val="lt1"/>
+          </a:fontRef>
+        </p:style>
+        <p:txBody>
+          <a:bodyPr wrap="square" rtlCol="0">
+            <a:spAutoFit/>
+          </a:bodyPr>
+          <a:lstStyle/>
+          <a:p>
+            <a:r>
+              <a:rPr lang="en-US" sz="2800" dirty="0">
+                <a:ln w="0"/>
+                <a:solidFill>
+                  <a:schemeClr val="accent1"/>
+                </a:solidFill>
+                <a:effectLst>
+                  <a:outerShdw blurRad="38100" dist="25400" dir="5400000" algn="ctr" rotWithShape="0">
+                    <a:srgbClr val="6E747A">
+                      <a:alpha val="43000"/>
+                    </a:srgbClr>
+                  </a:outerShdw>
+                </a:effectLst>
+              </a:rPr>
+              <a:t>Mean Square Error : 2.56</a:t>
+            </a:r>
+          </a:p>
+        </p:txBody>
+      </p:sp>
     </p:spTree>
   </p:cSld>
   <p:clrMapOvr>

</xml_diff>